<commit_message>
num_objs debugged for XAI related scripts
</commit_message>
<xml_diff>
--- a/Logs_N_Lab Meeting_04_25_2019.pptx
+++ b/Logs_N_Lab Meeting_04_25_2019.pptx
@@ -27,6 +27,8 @@
     <p:sldId id="274" r:id="rId21"/>
     <p:sldId id="275" r:id="rId22"/>
     <p:sldId id="276" r:id="rId23"/>
+    <p:sldId id="277" r:id="rId24"/>
+    <p:sldId id="278" r:id="rId25"/>
   </p:sldIdLst>
   <p:sldSz cx="9144000" cy="6858000" type="screen4x3"/>
   <p:notesSz cx="6858000" cy="9144000"/>
@@ -18453,19 +18455,7 @@
           <a:p>
             <a:r>
               <a:rPr lang="en-US" altLang="ko-KR" dirty="0" smtClean="0"/>
-              <a:t>Numerous Tips for learning </a:t>
-            </a:r>
-            <a:r>
-              <a:rPr lang="en-US" altLang="ko-KR" dirty="0" smtClean="0"/>
-              <a:t>(</a:t>
-            </a:r>
-            <a:r>
-              <a:rPr lang="en-US" altLang="ko-KR" dirty="0" smtClean="0"/>
-              <a:t>5/1</a:t>
-            </a:r>
-            <a:r>
-              <a:rPr lang="en-US" altLang="ko-KR" dirty="0" smtClean="0"/>
-              <a:t>)</a:t>
+              <a:t>Debug (5/1)</a:t>
             </a:r>
             <a:endParaRPr lang="ko-KR" altLang="en-US" dirty="0"/>
           </a:p>
@@ -18487,12 +18477,16 @@
           <a:lstStyle/>
           <a:p>
             <a:r>
+              <a:rPr lang="en-US" altLang="ko-KR" dirty="0" smtClean="0"/>
+              <a:t>Debug </a:t>
+            </a:r>
+            <a:r>
               <a:rPr lang="en-US" altLang="ko-KR" dirty="0"/>
-              <a:t>Important tips for image </a:t>
+              <a:t>for image </a:t>
             </a:r>
             <a:r>
               <a:rPr lang="en-US" altLang="ko-KR" dirty="0" smtClean="0"/>
-              <a:t>captioning (+ other learning mechanisms)</a:t>
+              <a:t>captioning</a:t>
             </a:r>
             <a:endParaRPr lang="en-US" altLang="ko-KR" dirty="0"/>
           </a:p>
@@ -18501,17 +18495,21 @@
           </a:p>
           <a:p>
             <a:pPr lvl="1"/>
-            <a:r>
-              <a:rPr lang="en-US" altLang="ko-KR" dirty="0" smtClean="0"/>
-              <a:t>6. </a:t>
-            </a:r>
             <a:r>
               <a:rPr lang="ko-KR" altLang="en-US" dirty="0" smtClean="0"/>
               <a:t>가장 기본적인 문제 발견</a:t>
             </a:r>
             <a:r>
               <a:rPr lang="en-US" altLang="ko-KR" dirty="0" smtClean="0"/>
-              <a:t>: </a:t>
+              <a:t>: [10 to 100] bottom-up </a:t>
+            </a:r>
+            <a:r>
+              <a:rPr lang="en-US" altLang="ko-KR" dirty="0" err="1" smtClean="0"/>
+              <a:t>pretrain</a:t>
+            </a:r>
+            <a:r>
+              <a:rPr lang="ko-KR" altLang="en-US" dirty="0" smtClean="0"/>
+              <a:t> 사용시</a:t>
             </a:r>
             <a:endParaRPr lang="ko-KR" altLang="en-US" dirty="0"/>
           </a:p>
@@ -18765,6 +18763,411 @@
     <p:extLst>
       <p:ext uri="{BB962C8B-B14F-4D97-AF65-F5344CB8AC3E}">
         <p14:creationId xmlns:p14="http://schemas.microsoft.com/office/powerpoint/2010/main" val="3180149548"/>
+      </p:ext>
+    </p:extLst>
+  </p:cSld>
+  <p:clrMapOvr>
+    <a:masterClrMapping/>
+  </p:clrMapOvr>
+  <p:timing>
+    <p:tnLst>
+      <p:par>
+        <p:cTn id="1" dur="indefinite" restart="never" nodeType="tmRoot"/>
+      </p:par>
+    </p:tnLst>
+  </p:timing>
+</p:sld>
+</file>
+
+<file path=ppt/slides/slide22.xml><?xml version="1.0" encoding="utf-8"?>
+<p:sld xmlns:a="http://schemas.openxmlformats.org/drawingml/2006/main" xmlns:r="http://schemas.openxmlformats.org/officeDocument/2006/relationships" xmlns:p="http://schemas.openxmlformats.org/presentationml/2006/main">
+  <p:cSld>
+    <p:spTree>
+      <p:nvGrpSpPr>
+        <p:cNvPr id="1" name=""/>
+        <p:cNvGrpSpPr/>
+        <p:nvPr/>
+      </p:nvGrpSpPr>
+      <p:grpSpPr>
+        <a:xfrm>
+          <a:off x="0" y="0"/>
+          <a:ext cx="0" cy="0"/>
+          <a:chOff x="0" y="0"/>
+          <a:chExt cx="0" cy="0"/>
+        </a:xfrm>
+      </p:grpSpPr>
+      <p:sp>
+        <p:nvSpPr>
+          <p:cNvPr id="2" name="제목 1"/>
+          <p:cNvSpPr>
+            <a:spLocks noGrp="1"/>
+          </p:cNvSpPr>
+          <p:nvPr>
+            <p:ph type="title"/>
+          </p:nvPr>
+        </p:nvSpPr>
+        <p:spPr/>
+        <p:txBody>
+          <a:bodyPr/>
+          <a:lstStyle/>
+          <a:p>
+            <a:r>
+              <a:rPr lang="en-US" altLang="ko-KR" dirty="0" smtClean="0"/>
+              <a:t>Debug - Solution (5/1)</a:t>
+            </a:r>
+            <a:endParaRPr lang="ko-KR" altLang="en-US" dirty="0"/>
+          </a:p>
+        </p:txBody>
+      </p:sp>
+      <p:pic>
+        <p:nvPicPr>
+          <p:cNvPr id="4" name="내용 개체 틀 3"/>
+          <p:cNvPicPr>
+            <a:picLocks noGrp="1" noChangeAspect="1"/>
+          </p:cNvPicPr>
+          <p:nvPr>
+            <p:ph idx="1"/>
+          </p:nvPr>
+        </p:nvPicPr>
+        <p:blipFill>
+          <a:blip r:embed="rId2"/>
+          <a:stretch>
+            <a:fillRect/>
+          </a:stretch>
+        </p:blipFill>
+        <p:spPr>
+          <a:xfrm>
+            <a:off x="0" y="1354916"/>
+            <a:ext cx="5338379" cy="5111750"/>
+          </a:xfrm>
+          <a:prstGeom prst="rect">
+            <a:avLst/>
+          </a:prstGeom>
+          <a:ln>
+            <a:solidFill>
+              <a:srgbClr val="FF0000"/>
+            </a:solidFill>
+          </a:ln>
+        </p:spPr>
+      </p:pic>
+      <p:pic>
+        <p:nvPicPr>
+          <p:cNvPr id="5" name="그림 4"/>
+          <p:cNvPicPr>
+            <a:picLocks noChangeAspect="1"/>
+          </p:cNvPicPr>
+          <p:nvPr/>
+        </p:nvPicPr>
+        <p:blipFill>
+          <a:blip r:embed="rId3"/>
+          <a:stretch>
+            <a:fillRect/>
+          </a:stretch>
+        </p:blipFill>
+        <p:spPr>
+          <a:xfrm>
+            <a:off x="4441334" y="3765116"/>
+            <a:ext cx="4104149" cy="2438169"/>
+          </a:xfrm>
+          <a:prstGeom prst="rect">
+            <a:avLst/>
+          </a:prstGeom>
+          <a:ln>
+            <a:solidFill>
+              <a:srgbClr val="FF0000"/>
+            </a:solidFill>
+          </a:ln>
+        </p:spPr>
+      </p:pic>
+      <p:sp>
+        <p:nvSpPr>
+          <p:cNvPr id="6" name="TextBox 5"/>
+          <p:cNvSpPr txBox="1"/>
+          <p:nvPr/>
+        </p:nvSpPr>
+        <p:spPr>
+          <a:xfrm>
+            <a:off x="5636029" y="2759825"/>
+            <a:ext cx="3158836" cy="923330"/>
+          </a:xfrm>
+          <a:prstGeom prst="rect">
+            <a:avLst/>
+          </a:prstGeom>
+          <a:noFill/>
+        </p:spPr>
+        <p:txBody>
+          <a:bodyPr wrap="square" rtlCol="0">
+            <a:spAutoFit/>
+          </a:bodyPr>
+          <a:lstStyle/>
+          <a:p>
+            <a:r>
+              <a:rPr lang="en-US" altLang="ko-KR" dirty="0" err="1" smtClean="0"/>
+              <a:t>trim_Collate</a:t>
+            </a:r>
+            <a:r>
+              <a:rPr lang="en-US" altLang="ko-KR" dirty="0" smtClean="0"/>
+              <a:t> </a:t>
+            </a:r>
+            <a:r>
+              <a:rPr lang="ko-KR" altLang="en-US" dirty="0" err="1" smtClean="0"/>
+              <a:t>하기전</a:t>
+            </a:r>
+            <a:r>
+              <a:rPr lang="ko-KR" altLang="en-US" dirty="0" smtClean="0"/>
+              <a:t> </a:t>
+            </a:r>
+            <a:r>
+              <a:rPr lang="ko-KR" altLang="en-US" dirty="0" err="1" smtClean="0"/>
+              <a:t>샘플마다의</a:t>
+            </a:r>
+            <a:r>
+              <a:rPr lang="ko-KR" altLang="en-US" dirty="0" smtClean="0"/>
+              <a:t> </a:t>
+            </a:r>
+            <a:r>
+              <a:rPr lang="en-US" altLang="ko-KR" dirty="0" smtClean="0"/>
+              <a:t>object </a:t>
+            </a:r>
+            <a:r>
+              <a:rPr lang="ko-KR" altLang="en-US" dirty="0" smtClean="0"/>
+              <a:t>개수를 저장하고 같이 </a:t>
+            </a:r>
+            <a:r>
+              <a:rPr lang="ko-KR" altLang="en-US" dirty="0" err="1" smtClean="0"/>
+              <a:t>리턴한다</a:t>
+            </a:r>
+            <a:r>
+              <a:rPr lang="en-US" altLang="ko-KR" dirty="0" smtClean="0"/>
+              <a:t>.</a:t>
+            </a:r>
+            <a:endParaRPr lang="ko-KR" altLang="en-US" dirty="0"/>
+          </a:p>
+        </p:txBody>
+      </p:sp>
+    </p:spTree>
+    <p:extLst>
+      <p:ext uri="{BB962C8B-B14F-4D97-AF65-F5344CB8AC3E}">
+        <p14:creationId xmlns:p14="http://schemas.microsoft.com/office/powerpoint/2010/main" val="1863202026"/>
+      </p:ext>
+    </p:extLst>
+  </p:cSld>
+  <p:clrMapOvr>
+    <a:masterClrMapping/>
+  </p:clrMapOvr>
+  <p:timing>
+    <p:tnLst>
+      <p:par>
+        <p:cTn id="1" dur="indefinite" restart="never" nodeType="tmRoot"/>
+      </p:par>
+    </p:tnLst>
+  </p:timing>
+</p:sld>
+</file>
+
+<file path=ppt/slides/slide23.xml><?xml version="1.0" encoding="utf-8"?>
+<p:sld xmlns:a="http://schemas.openxmlformats.org/drawingml/2006/main" xmlns:r="http://schemas.openxmlformats.org/officeDocument/2006/relationships" xmlns:p="http://schemas.openxmlformats.org/presentationml/2006/main">
+  <p:cSld>
+    <p:spTree>
+      <p:nvGrpSpPr>
+        <p:cNvPr id="1" name=""/>
+        <p:cNvGrpSpPr/>
+        <p:nvPr/>
+      </p:nvGrpSpPr>
+      <p:grpSpPr>
+        <a:xfrm>
+          <a:off x="0" y="0"/>
+          <a:ext cx="0" cy="0"/>
+          <a:chOff x="0" y="0"/>
+          <a:chExt cx="0" cy="0"/>
+        </a:xfrm>
+      </p:grpSpPr>
+      <p:sp>
+        <p:nvSpPr>
+          <p:cNvPr id="2" name="제목 1"/>
+          <p:cNvSpPr>
+            <a:spLocks noGrp="1"/>
+          </p:cNvSpPr>
+          <p:nvPr>
+            <p:ph type="title"/>
+          </p:nvPr>
+        </p:nvSpPr>
+        <p:spPr/>
+        <p:txBody>
+          <a:bodyPr/>
+          <a:lstStyle/>
+          <a:p>
+            <a:r>
+              <a:rPr lang="en-US" altLang="ko-KR" dirty="0" smtClean="0"/>
+              <a:t>Debug-solution</a:t>
+            </a:r>
+            <a:endParaRPr lang="ko-KR" altLang="en-US" dirty="0"/>
+          </a:p>
+        </p:txBody>
+      </p:sp>
+      <p:sp>
+        <p:nvSpPr>
+          <p:cNvPr id="3" name="내용 개체 틀 2"/>
+          <p:cNvSpPr>
+            <a:spLocks noGrp="1"/>
+          </p:cNvSpPr>
+          <p:nvPr>
+            <p:ph idx="1"/>
+          </p:nvPr>
+        </p:nvSpPr>
+        <p:spPr/>
+        <p:txBody>
+          <a:bodyPr/>
+          <a:lstStyle/>
+          <a:p>
+            <a:r>
+              <a:rPr lang="en-US" altLang="ko-KR" dirty="0" err="1" smtClean="0"/>
+              <a:t>Xai</a:t>
+            </a:r>
+            <a:r>
+              <a:rPr lang="en-US" altLang="ko-KR" dirty="0" smtClean="0"/>
+              <a:t> </a:t>
+            </a:r>
+            <a:r>
+              <a:rPr lang="ko-KR" altLang="en-US" dirty="0" smtClean="0"/>
+              <a:t>관련 코드에서 수정 사항들</a:t>
+            </a:r>
+            <a:r>
+              <a:rPr lang="en-US" altLang="ko-KR" dirty="0" smtClean="0"/>
+              <a:t>: (</a:t>
+            </a:r>
+            <a:r>
+              <a:rPr lang="ko-KR" altLang="en-US" dirty="0" smtClean="0"/>
+              <a:t>예</a:t>
+            </a:r>
+            <a:r>
+              <a:rPr lang="en-US" altLang="ko-KR" dirty="0" smtClean="0"/>
+              <a:t>: caption_ban_xai_demo.py)</a:t>
+            </a:r>
+            <a:endParaRPr lang="ko-KR" altLang="en-US" dirty="0"/>
+          </a:p>
+        </p:txBody>
+      </p:sp>
+      <p:pic>
+        <p:nvPicPr>
+          <p:cNvPr id="5" name="그림 4"/>
+          <p:cNvPicPr>
+            <a:picLocks noChangeAspect="1"/>
+          </p:cNvPicPr>
+          <p:nvPr/>
+        </p:nvPicPr>
+        <p:blipFill>
+          <a:blip r:embed="rId2"/>
+          <a:stretch>
+            <a:fillRect/>
+          </a:stretch>
+        </p:blipFill>
+        <p:spPr>
+          <a:xfrm>
+            <a:off x="457200" y="1691899"/>
+            <a:ext cx="5057775" cy="714375"/>
+          </a:xfrm>
+          <a:prstGeom prst="rect">
+            <a:avLst/>
+          </a:prstGeom>
+          <a:ln>
+            <a:solidFill>
+              <a:schemeClr val="tx1"/>
+            </a:solidFill>
+          </a:ln>
+        </p:spPr>
+      </p:pic>
+      <p:pic>
+        <p:nvPicPr>
+          <p:cNvPr id="8" name="그림 7"/>
+          <p:cNvPicPr>
+            <a:picLocks noChangeAspect="1"/>
+          </p:cNvPicPr>
+          <p:nvPr/>
+        </p:nvPicPr>
+        <p:blipFill>
+          <a:blip r:embed="rId3"/>
+          <a:stretch>
+            <a:fillRect/>
+          </a:stretch>
+        </p:blipFill>
+        <p:spPr>
+          <a:xfrm>
+            <a:off x="457200" y="2406274"/>
+            <a:ext cx="3105150" cy="904875"/>
+          </a:xfrm>
+          <a:prstGeom prst="rect">
+            <a:avLst/>
+          </a:prstGeom>
+          <a:ln>
+            <a:solidFill>
+              <a:schemeClr val="tx1"/>
+            </a:solidFill>
+          </a:ln>
+        </p:spPr>
+      </p:pic>
+      <p:pic>
+        <p:nvPicPr>
+          <p:cNvPr id="9" name="그림 8"/>
+          <p:cNvPicPr>
+            <a:picLocks noChangeAspect="1"/>
+          </p:cNvPicPr>
+          <p:nvPr/>
+        </p:nvPicPr>
+        <p:blipFill>
+          <a:blip r:embed="rId4"/>
+          <a:stretch>
+            <a:fillRect/>
+          </a:stretch>
+        </p:blipFill>
+        <p:spPr>
+          <a:xfrm>
+            <a:off x="457200" y="3311149"/>
+            <a:ext cx="1914525" cy="1314450"/>
+          </a:xfrm>
+          <a:prstGeom prst="rect">
+            <a:avLst/>
+          </a:prstGeom>
+          <a:ln>
+            <a:solidFill>
+              <a:schemeClr val="tx1"/>
+            </a:solidFill>
+          </a:ln>
+        </p:spPr>
+      </p:pic>
+      <p:pic>
+        <p:nvPicPr>
+          <p:cNvPr id="10" name="그림 9"/>
+          <p:cNvPicPr>
+            <a:picLocks noChangeAspect="1"/>
+          </p:cNvPicPr>
+          <p:nvPr/>
+        </p:nvPicPr>
+        <p:blipFill>
+          <a:blip r:embed="rId5"/>
+          <a:stretch>
+            <a:fillRect/>
+          </a:stretch>
+        </p:blipFill>
+        <p:spPr>
+          <a:xfrm>
+            <a:off x="457200" y="4625599"/>
+            <a:ext cx="8115300" cy="1000125"/>
+          </a:xfrm>
+          <a:prstGeom prst="rect">
+            <a:avLst/>
+          </a:prstGeom>
+          <a:ln>
+            <a:solidFill>
+              <a:schemeClr val="tx1"/>
+            </a:solidFill>
+          </a:ln>
+        </p:spPr>
+      </p:pic>
+    </p:spTree>
+    <p:extLst>
+      <p:ext uri="{BB962C8B-B14F-4D97-AF65-F5344CB8AC3E}">
+        <p14:creationId xmlns:p14="http://schemas.microsoft.com/office/powerpoint/2010/main" val="3619294328"/>
       </p:ext>
     </p:extLst>
   </p:cSld>

</xml_diff>